<commit_message>
Update powerpoint and add example build script
</commit_message>
<xml_diff>
--- a/2018-09-15-PS-Saturday-Paris/Building Better Bricks.pptx
+++ b/2018-09-15-PS-Saturday-Paris/Building Better Bricks.pptx
@@ -221,7 +221,7 @@
           <a:p>
             <a:fld id="{FE2814DB-3FE8-4D5F-8CD9-4811BD1986CE}" type="datetimeFigureOut">
               <a:rPr lang="en-GB" smtClean="0"/>
-              <a:t>30/08/2018</a:t>
+              <a:t>15/09/2018</a:t>
             </a:fld>
             <a:endParaRPr lang="en-GB"/>
           </a:p>
@@ -1890,7 +1890,7 @@
             <a:fld id="{0DB167C8-2E4E-4037-B5AE-AD31BBB99166}" type="datetime1">
               <a:rPr lang="fr-FR"/>
               <a:pPr lvl="0"/>
-              <a:t>30/08/2018</a:t>
+              <a:t>15/09/2018</a:t>
             </a:fld>
             <a:endParaRPr lang="fr-FR"/>
           </a:p>
@@ -2126,7 +2126,7 @@
             <a:fld id="{15876142-82B7-48AC-9971-E159D32A314F}" type="datetime1">
               <a:rPr lang="fr-FR"/>
               <a:pPr lvl="0"/>
-              <a:t>30/08/2018</a:t>
+              <a:t>15/09/2018</a:t>
             </a:fld>
             <a:endParaRPr lang="fr-FR"/>
           </a:p>
@@ -2372,7 +2372,7 @@
             <a:fld id="{4DCC1520-E680-4D91-9B95-B66C6EC433D4}" type="datetime1">
               <a:rPr lang="fr-FR"/>
               <a:pPr lvl="0"/>
-              <a:t>30/08/2018</a:t>
+              <a:t>15/09/2018</a:t>
             </a:fld>
             <a:endParaRPr lang="fr-FR"/>
           </a:p>
@@ -2608,7 +2608,7 @@
             <a:fld id="{96E04EFB-F6A4-4DD4-8DDB-76BB68517EF5}" type="datetime1">
               <a:rPr lang="fr-FR"/>
               <a:pPr lvl="0"/>
-              <a:t>30/08/2018</a:t>
+              <a:t>15/09/2018</a:t>
             </a:fld>
             <a:endParaRPr lang="fr-FR"/>
           </a:p>
@@ -2819,7 +2819,7 @@
             <a:fld id="{6166C97C-2803-493D-9EF0-E3372CFC9BDF}" type="datetime1">
               <a:rPr lang="fr-FR"/>
               <a:pPr lvl="0"/>
-              <a:t>30/08/2018</a:t>
+              <a:t>15/09/2018</a:t>
             </a:fld>
             <a:endParaRPr lang="fr-FR"/>
           </a:p>
@@ -3139,7 +3139,7 @@
             <a:fld id="{5A0448F5-B312-4A14-ADEF-D33E85FDA172}" type="datetime1">
               <a:rPr lang="fr-FR"/>
               <a:pPr lvl="0"/>
-              <a:t>30/08/2018</a:t>
+              <a:t>15/09/2018</a:t>
             </a:fld>
             <a:endParaRPr lang="fr-FR"/>
           </a:p>
@@ -3542,7 +3542,7 @@
             <a:fld id="{A207F05F-8EC2-41BB-957E-8CFA5FBEA258}" type="datetime1">
               <a:rPr lang="fr-FR"/>
               <a:pPr lvl="0"/>
-              <a:t>30/08/2018</a:t>
+              <a:t>15/09/2018</a:t>
             </a:fld>
             <a:endParaRPr lang="fr-FR"/>
           </a:p>
@@ -3704,7 +3704,7 @@
             <a:fld id="{3D85BDDE-3F29-4EC8-9FA3-84C584244416}" type="datetime1">
               <a:rPr lang="fr-FR"/>
               <a:pPr lvl="0"/>
-              <a:t>30/08/2018</a:t>
+              <a:t>15/09/2018</a:t>
             </a:fld>
             <a:endParaRPr lang="fr-FR"/>
           </a:p>
@@ -3832,7 +3832,7 @@
             <a:fld id="{0165F27F-8883-4A1B-9F63-F32A6BF54199}" type="datetime1">
               <a:rPr lang="fr-FR"/>
               <a:pPr lvl="0"/>
-              <a:t>30/08/2018</a:t>
+              <a:t>15/09/2018</a:t>
             </a:fld>
             <a:endParaRPr lang="fr-FR"/>
           </a:p>
@@ -4117,7 +4117,7 @@
             <a:fld id="{7735ACD9-3E2E-4F8B-9FE8-13C60CBBA3B2}" type="datetime1">
               <a:rPr lang="fr-FR"/>
               <a:pPr lvl="0"/>
-              <a:t>30/08/2018</a:t>
+              <a:t>15/09/2018</a:t>
             </a:fld>
             <a:endParaRPr lang="fr-FR"/>
           </a:p>
@@ -4359,7 +4359,7 @@
             <a:fld id="{080A9674-7E6E-4257-A0E2-963500693F32}" type="datetime1">
               <a:rPr lang="fr-FR"/>
               <a:pPr lvl="0"/>
-              <a:t>30/08/2018</a:t>
+              <a:t>15/09/2018</a:t>
             </a:fld>
             <a:endParaRPr lang="fr-FR"/>
           </a:p>
@@ -4642,7 +4642,7 @@
             <a:fld id="{34F5086F-A922-4133-99B7-FC3B77C86447}" type="datetime1">
               <a:rPr lang="fr-FR"/>
               <a:pPr lvl="0"/>
-              <a:t>30/08/2018</a:t>
+              <a:t>15/09/2018</a:t>
             </a:fld>
             <a:endParaRPr lang="fr-FR"/>
           </a:p>
@@ -11225,7 +11225,23 @@
                   <a:schemeClr val="bg1"/>
                 </a:solidFill>
               </a:rPr>
-              <a:t>We’re developers</a:t>
+              <a:t>We’re </a:t>
+            </a:r>
+            <a:r>
+              <a:rPr lang="en-GB" strike="sngStrike" dirty="0">
+                <a:solidFill>
+                  <a:schemeClr val="bg1"/>
+                </a:solidFill>
+              </a:rPr>
+              <a:t>developers</a:t>
+            </a:r>
+            <a:r>
+              <a:rPr lang="en-GB" dirty="0">
+                <a:solidFill>
+                  <a:schemeClr val="bg1"/>
+                </a:solidFill>
+              </a:rPr>
+              <a:t> technologist</a:t>
             </a:r>
           </a:p>
           <a:p>

</xml_diff>